<commit_message>
This adds the completed DotNet PPTs for days 1, 2, and 3.
</commit_message>
<xml_diff>
--- a/1-csharp/MarksCodeAndPPTs/DotNetPPTs/D3_.NET_CastingAndTypeConversion.pptx
+++ b/1-csharp/MarksCodeAndPPTs/DotNetPPTs/D3_.NET_CastingAndTypeConversion.pptx
@@ -125,7 +125,7 @@
 <file path=ppt/revisionInfo.xml><?xml version="1.0" encoding="utf-8"?>
 <p1510:revInfo xmlns:a="http://schemas.openxmlformats.org/drawingml/2006/main" xmlns:r="http://schemas.openxmlformats.org/officeDocument/2006/relationships" xmlns:p1510="http://schemas.microsoft.com/office/powerpoint/2015/10/main">
   <p1510:revLst>
-    <p1510:client id="{921FBE3F-1011-4838-AF11-4FBD081E7BE5}" v="60" dt="2020-03-03T23:54:49.904"/>
+    <p1510:client id="{921FBE3F-1011-4838-AF11-4FBD081E7BE5}" v="61" dt="2020-03-11T23:32:10.058"/>
   </p1510:revLst>
 </p1510:revInfo>
 </file>
@@ -374,7 +374,7 @@
           <a:p>
             <a:fld id="{9184DA70-C731-4C70-880D-CCD4705E623C}" type="datetime1">
               <a:rPr lang="en-US" smtClean="0"/>
-              <a:t>3/10/2020</a:t>
+              <a:t>3/11/2020</a:t>
             </a:fld>
             <a:endParaRPr lang="en-US" dirty="0"/>
           </a:p>
@@ -562,7 +562,7 @@
           <a:p>
             <a:fld id="{B612A279-0833-481D-8C56-F67FD0AC6C50}" type="datetime1">
               <a:rPr lang="en-US" smtClean="0"/>
-              <a:t>3/10/2020</a:t>
+              <a:t>3/11/2020</a:t>
             </a:fld>
             <a:endParaRPr lang="en-US" dirty="0"/>
           </a:p>
@@ -804,7 +804,7 @@
           <a:p>
             <a:fld id="{6587DA83-5663-4C9C-B9AA-0B40A3DAFF81}" type="datetime1">
               <a:rPr lang="en-US" smtClean="0"/>
-              <a:t>3/10/2020</a:t>
+              <a:t>3/11/2020</a:t>
             </a:fld>
             <a:endParaRPr lang="en-US" dirty="0"/>
           </a:p>
@@ -992,7 +992,7 @@
           <a:p>
             <a:fld id="{4BE1D723-8F53-4F53-90B0-1982A396982E}" type="datetime1">
               <a:rPr lang="en-US" smtClean="0"/>
-              <a:t>3/10/2020</a:t>
+              <a:t>3/11/2020</a:t>
             </a:fld>
             <a:endParaRPr lang="en-US" dirty="0"/>
           </a:p>
@@ -1365,7 +1365,7 @@
           <a:p>
             <a:fld id="{97669AF7-7BEB-44E4-9852-375E34362B5B}" type="datetime1">
               <a:rPr lang="en-US" smtClean="0"/>
-              <a:t>3/10/2020</a:t>
+              <a:t>3/11/2020</a:t>
             </a:fld>
             <a:endParaRPr lang="en-US" dirty="0"/>
           </a:p>
@@ -1620,7 +1620,7 @@
           <a:p>
             <a:fld id="{BAAAC38D-0552-4C82-B593-E6124DFADBE2}" type="datetime1">
               <a:rPr lang="en-US" smtClean="0"/>
-              <a:t>3/10/2020</a:t>
+              <a:t>3/11/2020</a:t>
             </a:fld>
             <a:endParaRPr lang="en-US" dirty="0"/>
           </a:p>
@@ -2017,7 +2017,7 @@
           <a:p>
             <a:fld id="{D9DF0F1C-5577-4ACB-BB62-DF8F3C494C7E}" type="datetime1">
               <a:rPr lang="en-US" smtClean="0"/>
-              <a:t>3/10/2020</a:t>
+              <a:t>3/11/2020</a:t>
             </a:fld>
             <a:endParaRPr lang="en-US" dirty="0"/>
           </a:p>
@@ -2153,7 +2153,7 @@
           <a:p>
             <a:fld id="{1775B394-D9F9-4F0C-B15D-605F45CB9E9F}" type="datetime1">
               <a:rPr lang="en-US" smtClean="0"/>
-              <a:t>3/10/2020</a:t>
+              <a:t>3/11/2020</a:t>
             </a:fld>
             <a:endParaRPr lang="en-US" dirty="0"/>
           </a:p>
@@ -2310,7 +2310,7 @@
           <a:p>
             <a:fld id="{39667345-2558-425A-8533-9BFDBCE15005}" type="datetime1">
               <a:rPr lang="en-US" smtClean="0"/>
-              <a:t>3/10/2020</a:t>
+              <a:t>3/11/2020</a:t>
             </a:fld>
             <a:endParaRPr lang="en-US" dirty="0"/>
           </a:p>
@@ -2639,7 +2639,7 @@
           <a:p>
             <a:fld id="{92BEA474-078D-4E9B-9B14-09A87B19DC46}" type="datetime1">
               <a:rPr lang="en-US" smtClean="0"/>
-              <a:t>3/10/2020</a:t>
+              <a:t>3/11/2020</a:t>
             </a:fld>
             <a:endParaRPr lang="en-US" dirty="0"/>
           </a:p>
@@ -2989,7 +2989,7 @@
           <a:p>
             <a:fld id="{4907D986-8816-4272-A432-0437A28A9828}" type="datetime1">
               <a:rPr lang="en-US" smtClean="0"/>
-              <a:t>3/10/2020</a:t>
+              <a:t>3/11/2020</a:t>
             </a:fld>
             <a:endParaRPr lang="en-US" dirty="0"/>
           </a:p>
@@ -3250,7 +3250,7 @@
           <a:p>
             <a:fld id="{62D6E202-B606-4609-B914-27C9371A1F6D}" type="datetime1">
               <a:rPr lang="en-US" smtClean="0"/>
-              <a:t>3/10/2020</a:t>
+              <a:t>3/11/2020</a:t>
             </a:fld>
             <a:endParaRPr lang="en-US" dirty="0"/>
           </a:p>
@@ -4108,63 +4108,67 @@
         </p:nvSpPr>
         <p:spPr>
           <a:xfrm>
-            <a:off x="1097280" y="2108201"/>
-            <a:ext cx="10058400" cy="4226084"/>
+            <a:off x="1097279" y="1913187"/>
+            <a:ext cx="10058400" cy="2078104"/>
           </a:xfrm>
         </p:spPr>
         <p:txBody>
           <a:bodyPr>
-            <a:normAutofit/>
+            <a:normAutofit lnSpcReduction="10000"/>
           </a:bodyPr>
           <a:lstStyle/>
           <a:p>
             <a:r>
-              <a:rPr lang="en-US" sz="2800" dirty="0"/>
+              <a:rPr lang="en-US" sz="3200" dirty="0"/>
               <a:t>The </a:t>
             </a:r>
             <a:r>
-              <a:rPr lang="en-US" sz="2800" b="1" i="1" dirty="0" err="1"/>
+              <a:rPr lang="en-US" sz="3200" b="1" i="1" dirty="0" err="1"/>
               <a:t>typeof</a:t>
             </a:r>
             <a:r>
-              <a:rPr lang="en-US" sz="2800" dirty="0"/>
+              <a:rPr lang="en-US" sz="3200" dirty="0"/>
               <a:t> operator obtains the </a:t>
             </a:r>
             <a:r>
-              <a:rPr lang="en-US" sz="2800" dirty="0" err="1"/>
+              <a:rPr lang="en-US" sz="3200" dirty="0" err="1"/>
               <a:t>System.Type</a:t>
             </a:r>
             <a:r>
-              <a:rPr lang="en-US" sz="2800" dirty="0"/>
+              <a:rPr lang="en-US" sz="3200" dirty="0"/>
               <a:t> instance type. The argument to the </a:t>
             </a:r>
             <a:r>
-              <a:rPr lang="en-US" sz="2800" b="1" i="1" dirty="0" err="1"/>
+              <a:rPr lang="en-US" sz="3200" b="1" i="1" dirty="0" err="1"/>
               <a:t>typeof</a:t>
             </a:r>
             <a:r>
-              <a:rPr lang="en-US" sz="2800" dirty="0"/>
+              <a:rPr lang="en-US" sz="3200" dirty="0"/>
               <a:t> operator must be the name of a </a:t>
             </a:r>
             <a:r>
-              <a:rPr lang="en-US" sz="2800" b="1" i="1" dirty="0"/>
+              <a:rPr lang="en-US" sz="3200" b="1" i="1" dirty="0"/>
               <a:t>type</a:t>
             </a:r>
             <a:r>
-              <a:rPr lang="en-US" sz="2800" dirty="0"/>
+              <a:rPr lang="en-US" sz="3200" dirty="0"/>
               <a:t> or a </a:t>
             </a:r>
             <a:r>
-              <a:rPr lang="en-US" sz="2800" b="1" i="1" dirty="0"/>
+              <a:rPr lang="en-US" sz="3200" b="1" i="1" dirty="0"/>
               <a:t>type</a:t>
             </a:r>
             <a:r>
-              <a:rPr lang="en-US" sz="2800" dirty="0"/>
+              <a:rPr lang="en-US" sz="3200" dirty="0"/>
               <a:t> </a:t>
             </a:r>
             <a:r>
-              <a:rPr lang="en-US" sz="2800" b="1" i="1" dirty="0"/>
-              <a:t>parameter.</a:t>
+              <a:rPr lang="en-US" sz="3200" b="1" i="1" dirty="0"/>
+              <a:t>parameter</a:t>
+            </a:r>
+            <a:r>
+              <a:rPr lang="en-US" sz="3200" dirty="0"/>
+              <a:t>. Watch for this in XML Serialization.</a:t>
             </a:r>
           </a:p>
         </p:txBody>
@@ -4191,7 +4195,7 @@
         </p:blipFill>
         <p:spPr>
           <a:xfrm>
-            <a:off x="2661077" y="3580454"/>
+            <a:off x="3640482" y="3532784"/>
             <a:ext cx="6930805" cy="2719182"/>
           </a:xfrm>
           <a:prstGeom prst="rect">
@@ -4291,12 +4295,14 @@
         </p:nvSpPr>
         <p:spPr>
           <a:xfrm>
-            <a:off x="1097280" y="1893049"/>
-            <a:ext cx="10058400" cy="3760891"/>
-          </a:xfrm>
-        </p:spPr>
-        <p:txBody>
-          <a:bodyPr/>
+            <a:off x="652463" y="1893049"/>
+            <a:ext cx="4843461" cy="4579189"/>
+          </a:xfrm>
+        </p:spPr>
+        <p:txBody>
+          <a:bodyPr anchor="ctr">
+            <a:normAutofit/>
+          </a:bodyPr>
           <a:lstStyle/>
           <a:p>
             <a:pPr lvl="1">
@@ -4304,39 +4310,39 @@
               <a:buChar char="•"/>
             </a:pPr>
             <a:r>
-              <a:rPr lang="en-US" dirty="0"/>
+              <a:rPr lang="en-US" sz="2400" dirty="0"/>
               <a:t>An expression cannot be an argument of the </a:t>
             </a:r>
             <a:r>
-              <a:rPr lang="en-US" b="1" i="1" dirty="0" err="1"/>
+              <a:rPr lang="en-US" sz="2400" b="1" i="1" dirty="0" err="1"/>
               <a:t>typeof</a:t>
             </a:r>
             <a:r>
-              <a:rPr lang="en-US" dirty="0"/>
+              <a:rPr lang="en-US" sz="2400" dirty="0"/>
               <a:t> operator. To get the </a:t>
             </a:r>
             <a:r>
-              <a:rPr lang="en-US" dirty="0" err="1"/>
+              <a:rPr lang="en-US" sz="2400" dirty="0" err="1"/>
               <a:t>System.Type</a:t>
             </a:r>
             <a:r>
-              <a:rPr lang="en-US" dirty="0"/>
+              <a:rPr lang="en-US" sz="2400" dirty="0"/>
               <a:t> instance for the runtime </a:t>
             </a:r>
             <a:r>
-              <a:rPr lang="en-US" b="1" i="1" dirty="0"/>
+              <a:rPr lang="en-US" sz="2400" b="1" i="1" dirty="0"/>
               <a:t>type</a:t>
             </a:r>
             <a:r>
-              <a:rPr lang="en-US" dirty="0"/>
+              <a:rPr lang="en-US" sz="2400" dirty="0"/>
               <a:t> of an expression result, use the </a:t>
             </a:r>
             <a:r>
-              <a:rPr lang="en-US" dirty="0" err="1"/>
+              <a:rPr lang="en-US" sz="2400" dirty="0" err="1"/>
               <a:t>Object.GetType</a:t>
             </a:r>
             <a:r>
-              <a:rPr lang="en-US" dirty="0"/>
+              <a:rPr lang="en-US" sz="2400" dirty="0"/>
               <a:t> method.</a:t>
             </a:r>
           </a:p>
@@ -4346,62 +4352,33 @@
               <a:buChar char="•"/>
             </a:pPr>
             <a:r>
-              <a:rPr lang="en-US" dirty="0"/>
+              <a:rPr lang="en-US" sz="2400" dirty="0"/>
               <a:t>Use the </a:t>
             </a:r>
             <a:r>
-              <a:rPr lang="en-US" b="1" i="1" dirty="0" err="1"/>
+              <a:rPr lang="en-US" sz="2400" b="1" i="1" dirty="0" err="1"/>
               <a:t>typeof</a:t>
             </a:r>
             <a:r>
-              <a:rPr lang="en-US" dirty="0"/>
+              <a:rPr lang="en-US" sz="2400" dirty="0"/>
               <a:t> operator to check if the runtime </a:t>
             </a:r>
             <a:r>
-              <a:rPr lang="en-US" b="1" i="1" dirty="0"/>
+              <a:rPr lang="en-US" sz="2400" b="1" i="1" dirty="0"/>
               <a:t>type</a:t>
             </a:r>
             <a:r>
-              <a:rPr lang="en-US" dirty="0"/>
+              <a:rPr lang="en-US" sz="2400" dirty="0"/>
               <a:t> of the expression result exactly matches a given </a:t>
             </a:r>
             <a:r>
-              <a:rPr lang="en-US" b="1" i="1" dirty="0"/>
+              <a:rPr lang="en-US" sz="2400" b="1" i="1" dirty="0"/>
               <a:t>type</a:t>
             </a:r>
             <a:r>
-              <a:rPr lang="en-US" dirty="0"/>
+              <a:rPr lang="en-US" sz="2400" dirty="0"/>
               <a:t>.</a:t>
             </a:r>
-          </a:p>
-          <a:p>
-            <a:pPr lvl="1">
-              <a:buFont typeface="Arial" panose="020B0604020202020204" pitchFamily="34" charset="0"/>
-              <a:buChar char="•"/>
-            </a:pPr>
-            <a:r>
-              <a:rPr lang="en-US" dirty="0"/>
-              <a:t>This example demonstrates the difference between type checking performed with the </a:t>
-            </a:r>
-            <a:r>
-              <a:rPr lang="en-US" dirty="0" err="1"/>
-              <a:t>typeof</a:t>
-            </a:r>
-            <a:r>
-              <a:rPr lang="en-US" dirty="0"/>
-              <a:t> operator and the </a:t>
-            </a:r>
-            <a:r>
-              <a:rPr lang="en-US" b="1" i="1" dirty="0"/>
-              <a:t>is</a:t>
-            </a:r>
-            <a:r>
-              <a:rPr lang="en-US" dirty="0"/>
-              <a:t> operator:</a:t>
-            </a:r>
-          </a:p>
-          <a:p>
-            <a:endParaRPr lang="en-US" dirty="0"/>
           </a:p>
         </p:txBody>
       </p:sp>
@@ -4427,19 +4404,70 @@
         </p:blipFill>
         <p:spPr>
           <a:xfrm>
-            <a:off x="3012141" y="3190432"/>
-            <a:ext cx="6716061" cy="3482771"/>
+            <a:off x="5681663" y="3195194"/>
+            <a:ext cx="6265864" cy="3482771"/>
           </a:xfrm>
           <a:prstGeom prst="rect">
             <a:avLst/>
           </a:prstGeom>
           <a:effectLst>
             <a:glow rad="50800">
-              <a:schemeClr val="accent1"/>
+              <a:schemeClr val="bg1"/>
             </a:glow>
           </a:effectLst>
         </p:spPr>
       </p:pic>
+      <p:sp>
+        <p:nvSpPr>
+          <p:cNvPr id="5" name="Rectangle 4">
+            <a:extLst>
+              <a:ext uri="{FF2B5EF4-FFF2-40B4-BE49-F238E27FC236}">
+                <a16:creationId xmlns:a16="http://schemas.microsoft.com/office/drawing/2014/main" id="{8CB94462-3A1C-4403-8A78-EA672FA326CE}"/>
+              </a:ext>
+            </a:extLst>
+          </p:cNvPr>
+          <p:cNvSpPr/>
+          <p:nvPr/>
+        </p:nvSpPr>
+        <p:spPr>
+          <a:xfrm>
+            <a:off x="6010276" y="2083550"/>
+            <a:ext cx="5360989" cy="1015663"/>
+          </a:xfrm>
+          <a:prstGeom prst="rect">
+            <a:avLst/>
+          </a:prstGeom>
+        </p:spPr>
+        <p:txBody>
+          <a:bodyPr wrap="square">
+            <a:spAutoFit/>
+          </a:bodyPr>
+          <a:lstStyle/>
+          <a:p>
+            <a:pPr lvl="1" algn="ctr"/>
+            <a:r>
+              <a:rPr lang="en-US" sz="2000" dirty="0"/>
+              <a:t>This example demonstrates the difference between type checking performed with the </a:t>
+            </a:r>
+            <a:r>
+              <a:rPr lang="en-US" sz="2000" dirty="0" err="1"/>
+              <a:t>typeof</a:t>
+            </a:r>
+            <a:r>
+              <a:rPr lang="en-US" sz="2000" dirty="0"/>
+              <a:t> operator and the </a:t>
+            </a:r>
+            <a:r>
+              <a:rPr lang="en-US" sz="2000" b="1" i="1" dirty="0"/>
+              <a:t>is</a:t>
+            </a:r>
+            <a:r>
+              <a:rPr lang="en-US" sz="2000" dirty="0"/>
+              <a:t> operator.</a:t>
+            </a:r>
+          </a:p>
+        </p:txBody>
+      </p:sp>
     </p:spTree>
     <p:extLst>
       <p:ext uri="{BB962C8B-B14F-4D97-AF65-F5344CB8AC3E}">
@@ -4760,7 +4788,7 @@
           <a:lstStyle/>
           <a:p>
             <a:r>
-              <a:rPr lang="en-US" sz="3200" dirty="0"/>
+              <a:rPr lang="en-US" sz="3600" dirty="0"/>
               <a:t>There are 2 types of conversions in C#:</a:t>
             </a:r>
           </a:p>
@@ -4770,11 +4798,11 @@
               <a:buChar char="•"/>
             </a:pPr>
             <a:r>
-              <a:rPr lang="en-US" sz="2800" u="sng" dirty="0"/>
+              <a:rPr lang="en-US" sz="3200" u="sng" dirty="0"/>
               <a:t>Implicit conversions</a:t>
             </a:r>
             <a:r>
-              <a:rPr lang="en-US" sz="2800" dirty="0"/>
+              <a:rPr lang="en-US" sz="3200" dirty="0"/>
               <a:t>: No special syntax required, is type safe, no data loss.</a:t>
             </a:r>
           </a:p>
@@ -4784,13 +4812,20 @@
               <a:buChar char="•"/>
             </a:pPr>
             <a:r>
-              <a:rPr lang="en-US" sz="2800" u="sng" dirty="0"/>
+              <a:rPr lang="en-US" sz="3200" u="sng" dirty="0"/>
               <a:t>Explicit conversions (casts)</a:t>
             </a:r>
             <a:r>
-              <a:rPr lang="en-US" sz="2800" dirty="0"/>
+              <a:rPr lang="en-US" sz="3200" dirty="0"/>
               <a:t>: Explicit conversions require the cast operator (). Required when data might be lost in the conversion, or when failure could occur.</a:t>
             </a:r>
+          </a:p>
+          <a:p>
+            <a:pPr lvl="1">
+              <a:buFont typeface="Arial" panose="020B0604020202020204" pitchFamily="34" charset="0"/>
+              <a:buChar char="•"/>
+            </a:pPr>
+            <a:endParaRPr lang="en-US" sz="3200" dirty="0"/>
           </a:p>
         </p:txBody>
       </p:sp>
@@ -4902,7 +4937,7 @@
             </a:r>
             <a:r>
               <a:rPr lang="en-US" dirty="0"/>
-              <a:t> types, an implicit conversion can be made when the value to be stored can fit into the variable without being truncated or rounded off. </a:t>
+              <a:t> types, an implicit conversion can be made when the value to be stored can fit into the variable memory without being truncated.</a:t>
             </a:r>
           </a:p>
           <a:p>
@@ -4924,7 +4959,7 @@
             </a:r>
             <a:r>
               <a:rPr lang="en-US" dirty="0"/>
-              <a:t> is a proper subset of the range for the target </a:t>
+              <a:t> is at least as big as the target </a:t>
             </a:r>
             <a:r>
               <a:rPr lang="en-US" b="1" i="1" dirty="0"/>
@@ -4959,8 +4994,8 @@
         </p:blipFill>
         <p:spPr>
           <a:xfrm>
-            <a:off x="5914306" y="2533542"/>
-            <a:ext cx="5539472" cy="1311613"/>
+            <a:off x="5664420" y="2394338"/>
+            <a:ext cx="6127387" cy="1450817"/>
           </a:xfrm>
           <a:prstGeom prst="rect">
             <a:avLst/>
@@ -5034,8 +5069,8 @@
         </p:blipFill>
         <p:spPr>
           <a:xfrm>
-            <a:off x="5909727" y="4941082"/>
-            <a:ext cx="5544051" cy="1139028"/>
+            <a:off x="5659356" y="4820195"/>
+            <a:ext cx="6132451" cy="1259915"/>
           </a:xfrm>
           <a:prstGeom prst="rect">
             <a:avLst/>
@@ -5172,7 +5207,7 @@
         </p:spPr>
         <p:txBody>
           <a:bodyPr>
-            <a:normAutofit fontScale="92500" lnSpcReduction="20000"/>
+            <a:normAutofit fontScale="85000" lnSpcReduction="20000"/>
           </a:bodyPr>
           <a:lstStyle/>
           <a:p>
@@ -5181,7 +5216,7 @@
             </a:pPr>
             <a:r>
               <a:rPr lang="en-US" sz="2400" dirty="0"/>
-              <a:t>If a conversion cannot be made without a risk of losing information, you must perform a </a:t>
+              <a:t>If there is a risk of losing information, you must perform a </a:t>
             </a:r>
             <a:r>
               <a:rPr lang="en-US" sz="2400" b="1" i="1" dirty="0"/>
@@ -5197,7 +5232,16 @@
             </a:r>
             <a:r>
               <a:rPr lang="en-US" sz="2400" dirty="0"/>
-              <a:t> that you are casting to in parentheses in front of the value or variable to be converted.</a:t>
+              <a:t> that you are casting to in ( ) in front of the value or variable to be converted. </a:t>
+            </a:r>
+          </a:p>
+          <a:p>
+            <a:pPr marL="0" indent="0">
+              <a:buNone/>
+            </a:pPr>
+            <a:r>
+              <a:rPr lang="en-US" sz="2400" dirty="0"/>
+              <a:t>*This doesn’t prevent the loss of data.</a:t>
             </a:r>
           </a:p>
         </p:txBody>
@@ -5224,7 +5268,7 @@
         </p:blipFill>
         <p:spPr>
           <a:xfrm>
-            <a:off x="1545353" y="3555358"/>
+            <a:off x="1783704" y="3556418"/>
             <a:ext cx="3510741" cy="2806441"/>
           </a:xfrm>
           <a:prstGeom prst="rect">
@@ -5261,15 +5305,7 @@
           <a:p>
             <a:r>
               <a:rPr lang="en-US" sz="2400" dirty="0"/>
-              <a:t>For </a:t>
-            </a:r>
-            <a:r>
-              <a:rPr lang="en-US" sz="2400" b="1" i="1" dirty="0"/>
-              <a:t>reference</a:t>
-            </a:r>
-            <a:r>
-              <a:rPr lang="en-US" sz="2400" dirty="0"/>
-              <a:t> types, an explicit </a:t>
+              <a:t>An explicit </a:t>
             </a:r>
             <a:r>
               <a:rPr lang="en-US" sz="2400" b="1" i="1" dirty="0"/>

</xml_diff>

<commit_message>
adds a few ppts and alters a few more.
</commit_message>
<xml_diff>
--- a/1-csharp/MarksCodeAndPPTs/DotNetPPTs/D3_.NET_CastingAndTypeConversion.pptx
+++ b/1-csharp/MarksCodeAndPPTs/DotNetPPTs/D3_.NET_CastingAndTypeConversion.pptx
@@ -4686,8 +4686,8 @@
         </p:nvSpPr>
         <p:spPr>
           <a:xfrm>
-            <a:off x="359693" y="147344"/>
-            <a:ext cx="11622847" cy="4154984"/>
+            <a:off x="1448144" y="380644"/>
+            <a:ext cx="9226339" cy="4154984"/>
           </a:xfrm>
           <a:prstGeom prst="rect">
             <a:avLst/>
@@ -4700,10 +4700,6 @@
           </a:bodyPr>
           <a:lstStyle/>
           <a:p>
-            <a:pPr marL="342900" indent="-342900">
-              <a:buFont typeface="Arial" panose="020B0604020202020204" pitchFamily="34" charset="0"/>
-              <a:buChar char="•"/>
-            </a:pPr>
             <a:r>
               <a:rPr lang="en-US" sz="2400" dirty="0"/>
               <a:t>C# is </a:t>
@@ -4718,23 +4714,9 @@
             </a:r>
           </a:p>
           <a:p>
-            <a:pPr marL="342900" indent="-342900">
-              <a:buFont typeface="Arial" panose="020B0604020202020204" pitchFamily="34" charset="0"/>
-              <a:buChar char="•"/>
-            </a:pPr>
             <a:r>
               <a:rPr lang="en-US" sz="2400" dirty="0"/>
-              <a:t>After a variable is declared, </a:t>
-            </a:r>
-          </a:p>
-          <a:p>
-            <a:pPr marL="800100" lvl="1" indent="-342900">
-              <a:buFont typeface="Arial" panose="020B0604020202020204" pitchFamily="34" charset="0"/>
-              <a:buChar char="•"/>
-            </a:pPr>
-            <a:r>
-              <a:rPr lang="en-US" sz="2400" dirty="0"/>
-              <a:t>it cannot be declared again or assigned a value of another type </a:t>
+              <a:t>After a variable is declared, it cannot be declared again or assigned a value of another type </a:t>
             </a:r>
             <a:r>
               <a:rPr lang="en-US" sz="2400" u="sng" dirty="0"/>
@@ -4750,33 +4732,9 @@
             <a:endParaRPr lang="en-US" sz="2400" dirty="0"/>
           </a:p>
           <a:p>
-            <a:pPr marL="342900" indent="-342900">
-              <a:buFont typeface="Arial" panose="020B0604020202020204" pitchFamily="34" charset="0"/>
-              <a:buChar char="•"/>
-            </a:pPr>
             <a:r>
               <a:rPr lang="en-US" sz="2400" dirty="0"/>
-              <a:t>What if you need to copy a value into a variable or method parameter of another type? </a:t>
-            </a:r>
-          </a:p>
-          <a:p>
-            <a:pPr marL="342900" indent="-342900">
-              <a:buFont typeface="Arial" panose="020B0604020202020204" pitchFamily="34" charset="0"/>
-              <a:buChar char="•"/>
-            </a:pPr>
-            <a:r>
-              <a:rPr lang="en-US" sz="2400" dirty="0"/>
-              <a:t>What if you have an integer variable that you need to pass to a method whose parameter is typed as double? </a:t>
-            </a:r>
-          </a:p>
-          <a:p>
-            <a:pPr marL="342900" indent="-342900">
-              <a:buFont typeface="Arial" panose="020B0604020202020204" pitchFamily="34" charset="0"/>
-              <a:buChar char="•"/>
-            </a:pPr>
-            <a:r>
-              <a:rPr lang="en-US" sz="2400" dirty="0"/>
-              <a:t>What if you need to assign a class variable to a variable of an interface type? </a:t>
+              <a:t>What if you need to copy a value into a variable or method parameter of another type? What if you have an integer variable that you need to pass to a method whose parameter is typed as double? What if you need to assign a class variable to a variable of an interface type? </a:t>
             </a:r>
             <a:br>
               <a:rPr lang="en-US" sz="2400" dirty="0"/>
@@ -4784,10 +4742,6 @@
             <a:endParaRPr lang="en-US" sz="2400" dirty="0"/>
           </a:p>
           <a:p>
-            <a:pPr marL="342900" indent="-342900">
-              <a:buFont typeface="Arial" panose="020B0604020202020204" pitchFamily="34" charset="0"/>
-              <a:buChar char="•"/>
-            </a:pPr>
             <a:r>
               <a:rPr lang="en-US" sz="2400" dirty="0"/>
               <a:t>These operations are called </a:t>

</xml_diff>